<commit_message>
Tweak CS2103 week 6 topics
</commit_message>
<xml_diff>
--- a/diagrams/uml/sequenceDiagrams/loops/playerText.pptx
+++ b/diagrams/uml/sequenceDiagrams/loops/playerText.pptx
@@ -104,6 +104,22 @@
       </a:defRPr>
     </a:lvl9pPr>
   </p:defaultTextStyle>
+  <p:extLst>
+    <p:ext uri="{EFAFB233-063F-42B5-8137-9DF3F51BA10A}">
+      <p15:sldGuideLst xmlns:p15="http://schemas.microsoft.com/office/powerpoint/2012/main">
+        <p15:guide id="1" orient="horz" pos="2160">
+          <p15:clr>
+            <a:srgbClr val="A4A3A4"/>
+          </p15:clr>
+        </p15:guide>
+        <p15:guide id="2" pos="2880">
+          <p15:clr>
+            <a:srgbClr val="A4A3A4"/>
+          </p15:clr>
+        </p15:guide>
+      </p15:sldGuideLst>
+    </p:ext>
+  </p:extLst>
 </p:presentation>
 </file>
 
@@ -145,7 +161,7 @@
           <a:lstStyle/>
           <a:p>
             <a:r>
-              <a:rPr lang="en-US" smtClean="0"/>
+              <a:rPr lang="en-US"/>
               <a:t>Click to edit Master title style</a:t>
             </a:r>
             <a:endParaRPr lang="en-SG"/>
@@ -264,7 +280,7 @@
           </a:lstStyle>
           <a:p>
             <a:r>
-              <a:rPr lang="en-US" smtClean="0"/>
+              <a:rPr lang="en-US"/>
               <a:t>Click to edit Master subtitle style</a:t>
             </a:r>
             <a:endParaRPr lang="en-SG"/>
@@ -288,7 +304,7 @@
           <a:p>
             <a:fld id="{4774CCBD-3109-4052-850F-719DC0B1A9B8}" type="datetimeFigureOut">
               <a:rPr lang="en-SG" smtClean="0"/>
-              <a:t>1/6/2017</a:t>
+              <a:t>9/8/2023</a:t>
             </a:fld>
             <a:endParaRPr lang="en-SG"/>
           </a:p>
@@ -382,7 +398,7 @@
           <a:lstStyle/>
           <a:p>
             <a:r>
-              <a:rPr lang="en-US" smtClean="0"/>
+              <a:rPr lang="en-US"/>
               <a:t>Click to edit Master title style</a:t>
             </a:r>
             <a:endParaRPr lang="en-SG"/>
@@ -406,35 +422,35 @@
           <a:p>
             <a:pPr lvl="0"/>
             <a:r>
-              <a:rPr lang="en-US" smtClean="0"/>
+              <a:rPr lang="en-US"/>
               <a:t>Click to edit Master text styles</a:t>
             </a:r>
           </a:p>
           <a:p>
             <a:pPr lvl="1"/>
             <a:r>
-              <a:rPr lang="en-US" smtClean="0"/>
+              <a:rPr lang="en-US"/>
               <a:t>Second level</a:t>
             </a:r>
           </a:p>
           <a:p>
             <a:pPr lvl="2"/>
             <a:r>
-              <a:rPr lang="en-US" smtClean="0"/>
+              <a:rPr lang="en-US"/>
               <a:t>Third level</a:t>
             </a:r>
           </a:p>
           <a:p>
             <a:pPr lvl="3"/>
             <a:r>
-              <a:rPr lang="en-US" smtClean="0"/>
+              <a:rPr lang="en-US"/>
               <a:t>Fourth level</a:t>
             </a:r>
           </a:p>
           <a:p>
             <a:pPr lvl="4"/>
             <a:r>
-              <a:rPr lang="en-US" smtClean="0"/>
+              <a:rPr lang="en-US"/>
               <a:t>Fifth level</a:t>
             </a:r>
             <a:endParaRPr lang="en-SG"/>
@@ -458,7 +474,7 @@
           <a:p>
             <a:fld id="{4774CCBD-3109-4052-850F-719DC0B1A9B8}" type="datetimeFigureOut">
               <a:rPr lang="en-SG" smtClean="0"/>
-              <a:t>1/6/2017</a:t>
+              <a:t>9/8/2023</a:t>
             </a:fld>
             <a:endParaRPr lang="en-SG"/>
           </a:p>
@@ -557,7 +573,7 @@
           <a:lstStyle/>
           <a:p>
             <a:r>
-              <a:rPr lang="en-US" smtClean="0"/>
+              <a:rPr lang="en-US"/>
               <a:t>Click to edit Master title style</a:t>
             </a:r>
             <a:endParaRPr lang="en-SG"/>
@@ -586,35 +602,35 @@
           <a:p>
             <a:pPr lvl="0"/>
             <a:r>
-              <a:rPr lang="en-US" smtClean="0"/>
+              <a:rPr lang="en-US"/>
               <a:t>Click to edit Master text styles</a:t>
             </a:r>
           </a:p>
           <a:p>
             <a:pPr lvl="1"/>
             <a:r>
-              <a:rPr lang="en-US" smtClean="0"/>
+              <a:rPr lang="en-US"/>
               <a:t>Second level</a:t>
             </a:r>
           </a:p>
           <a:p>
             <a:pPr lvl="2"/>
             <a:r>
-              <a:rPr lang="en-US" smtClean="0"/>
+              <a:rPr lang="en-US"/>
               <a:t>Third level</a:t>
             </a:r>
           </a:p>
           <a:p>
             <a:pPr lvl="3"/>
             <a:r>
-              <a:rPr lang="en-US" smtClean="0"/>
+              <a:rPr lang="en-US"/>
               <a:t>Fourth level</a:t>
             </a:r>
           </a:p>
           <a:p>
             <a:pPr lvl="4"/>
             <a:r>
-              <a:rPr lang="en-US" smtClean="0"/>
+              <a:rPr lang="en-US"/>
               <a:t>Fifth level</a:t>
             </a:r>
             <a:endParaRPr lang="en-SG"/>
@@ -638,7 +654,7 @@
           <a:p>
             <a:fld id="{4774CCBD-3109-4052-850F-719DC0B1A9B8}" type="datetimeFigureOut">
               <a:rPr lang="en-SG" smtClean="0"/>
-              <a:t>1/6/2017</a:t>
+              <a:t>9/8/2023</a:t>
             </a:fld>
             <a:endParaRPr lang="en-SG"/>
           </a:p>
@@ -732,7 +748,7 @@
           <a:lstStyle/>
           <a:p>
             <a:r>
-              <a:rPr lang="en-US" smtClean="0"/>
+              <a:rPr lang="en-US"/>
               <a:t>Click to edit Master title style</a:t>
             </a:r>
             <a:endParaRPr lang="en-SG"/>
@@ -756,35 +772,35 @@
           <a:p>
             <a:pPr lvl="0"/>
             <a:r>
-              <a:rPr lang="en-US" smtClean="0"/>
+              <a:rPr lang="en-US"/>
               <a:t>Click to edit Master text styles</a:t>
             </a:r>
           </a:p>
           <a:p>
             <a:pPr lvl="1"/>
             <a:r>
-              <a:rPr lang="en-US" smtClean="0"/>
+              <a:rPr lang="en-US"/>
               <a:t>Second level</a:t>
             </a:r>
           </a:p>
           <a:p>
             <a:pPr lvl="2"/>
             <a:r>
-              <a:rPr lang="en-US" smtClean="0"/>
+              <a:rPr lang="en-US"/>
               <a:t>Third level</a:t>
             </a:r>
           </a:p>
           <a:p>
             <a:pPr lvl="3"/>
             <a:r>
-              <a:rPr lang="en-US" smtClean="0"/>
+              <a:rPr lang="en-US"/>
               <a:t>Fourth level</a:t>
             </a:r>
           </a:p>
           <a:p>
             <a:pPr lvl="4"/>
             <a:r>
-              <a:rPr lang="en-US" smtClean="0"/>
+              <a:rPr lang="en-US"/>
               <a:t>Fifth level</a:t>
             </a:r>
             <a:endParaRPr lang="en-SG"/>
@@ -808,7 +824,7 @@
           <a:p>
             <a:fld id="{4774CCBD-3109-4052-850F-719DC0B1A9B8}" type="datetimeFigureOut">
               <a:rPr lang="en-SG" smtClean="0"/>
-              <a:t>1/6/2017</a:t>
+              <a:t>9/8/2023</a:t>
             </a:fld>
             <a:endParaRPr lang="en-SG"/>
           </a:p>
@@ -911,7 +927,7 @@
           </a:lstStyle>
           <a:p>
             <a:r>
-              <a:rPr lang="en-US" smtClean="0"/>
+              <a:rPr lang="en-US"/>
               <a:t>Click to edit Master title style</a:t>
             </a:r>
             <a:endParaRPr lang="en-SG"/>
@@ -1031,7 +1047,7 @@
           <a:p>
             <a:pPr lvl="0"/>
             <a:r>
-              <a:rPr lang="en-US" smtClean="0"/>
+              <a:rPr lang="en-US"/>
               <a:t>Click to edit Master text styles</a:t>
             </a:r>
           </a:p>
@@ -1054,7 +1070,7 @@
           <a:p>
             <a:fld id="{4774CCBD-3109-4052-850F-719DC0B1A9B8}" type="datetimeFigureOut">
               <a:rPr lang="en-SG" smtClean="0"/>
-              <a:t>1/6/2017</a:t>
+              <a:t>9/8/2023</a:t>
             </a:fld>
             <a:endParaRPr lang="en-SG"/>
           </a:p>
@@ -1148,7 +1164,7 @@
           <a:lstStyle/>
           <a:p>
             <a:r>
-              <a:rPr lang="en-US" smtClean="0"/>
+              <a:rPr lang="en-US"/>
               <a:t>Click to edit Master title style</a:t>
             </a:r>
             <a:endParaRPr lang="en-SG"/>
@@ -1205,35 +1221,35 @@
           <a:p>
             <a:pPr lvl="0"/>
             <a:r>
-              <a:rPr lang="en-US" smtClean="0"/>
+              <a:rPr lang="en-US"/>
               <a:t>Click to edit Master text styles</a:t>
             </a:r>
           </a:p>
           <a:p>
             <a:pPr lvl="1"/>
             <a:r>
-              <a:rPr lang="en-US" smtClean="0"/>
+              <a:rPr lang="en-US"/>
               <a:t>Second level</a:t>
             </a:r>
           </a:p>
           <a:p>
             <a:pPr lvl="2"/>
             <a:r>
-              <a:rPr lang="en-US" smtClean="0"/>
+              <a:rPr lang="en-US"/>
               <a:t>Third level</a:t>
             </a:r>
           </a:p>
           <a:p>
             <a:pPr lvl="3"/>
             <a:r>
-              <a:rPr lang="en-US" smtClean="0"/>
+              <a:rPr lang="en-US"/>
               <a:t>Fourth level</a:t>
             </a:r>
           </a:p>
           <a:p>
             <a:pPr lvl="4"/>
             <a:r>
-              <a:rPr lang="en-US" smtClean="0"/>
+              <a:rPr lang="en-US"/>
               <a:t>Fifth level</a:t>
             </a:r>
             <a:endParaRPr lang="en-SG"/>
@@ -1290,35 +1306,35 @@
           <a:p>
             <a:pPr lvl="0"/>
             <a:r>
-              <a:rPr lang="en-US" smtClean="0"/>
+              <a:rPr lang="en-US"/>
               <a:t>Click to edit Master text styles</a:t>
             </a:r>
           </a:p>
           <a:p>
             <a:pPr lvl="1"/>
             <a:r>
-              <a:rPr lang="en-US" smtClean="0"/>
+              <a:rPr lang="en-US"/>
               <a:t>Second level</a:t>
             </a:r>
           </a:p>
           <a:p>
             <a:pPr lvl="2"/>
             <a:r>
-              <a:rPr lang="en-US" smtClean="0"/>
+              <a:rPr lang="en-US"/>
               <a:t>Third level</a:t>
             </a:r>
           </a:p>
           <a:p>
             <a:pPr lvl="3"/>
             <a:r>
-              <a:rPr lang="en-US" smtClean="0"/>
+              <a:rPr lang="en-US"/>
               <a:t>Fourth level</a:t>
             </a:r>
           </a:p>
           <a:p>
             <a:pPr lvl="4"/>
             <a:r>
-              <a:rPr lang="en-US" smtClean="0"/>
+              <a:rPr lang="en-US"/>
               <a:t>Fifth level</a:t>
             </a:r>
             <a:endParaRPr lang="en-SG"/>
@@ -1342,7 +1358,7 @@
           <a:p>
             <a:fld id="{4774CCBD-3109-4052-850F-719DC0B1A9B8}" type="datetimeFigureOut">
               <a:rPr lang="en-SG" smtClean="0"/>
-              <a:t>1/6/2017</a:t>
+              <a:t>9/8/2023</a:t>
             </a:fld>
             <a:endParaRPr lang="en-SG"/>
           </a:p>
@@ -1440,7 +1456,7 @@
           </a:lstStyle>
           <a:p>
             <a:r>
-              <a:rPr lang="en-US" smtClean="0"/>
+              <a:rPr lang="en-US"/>
               <a:t>Click to edit Master title style</a:t>
             </a:r>
             <a:endParaRPr lang="en-SG"/>
@@ -1506,7 +1522,7 @@
           <a:p>
             <a:pPr lvl="0"/>
             <a:r>
-              <a:rPr lang="en-US" smtClean="0"/>
+              <a:rPr lang="en-US"/>
               <a:t>Click to edit Master text styles</a:t>
             </a:r>
           </a:p>
@@ -1562,35 +1578,35 @@
           <a:p>
             <a:pPr lvl="0"/>
             <a:r>
-              <a:rPr lang="en-US" smtClean="0"/>
+              <a:rPr lang="en-US"/>
               <a:t>Click to edit Master text styles</a:t>
             </a:r>
           </a:p>
           <a:p>
             <a:pPr lvl="1"/>
             <a:r>
-              <a:rPr lang="en-US" smtClean="0"/>
+              <a:rPr lang="en-US"/>
               <a:t>Second level</a:t>
             </a:r>
           </a:p>
           <a:p>
             <a:pPr lvl="2"/>
             <a:r>
-              <a:rPr lang="en-US" smtClean="0"/>
+              <a:rPr lang="en-US"/>
               <a:t>Third level</a:t>
             </a:r>
           </a:p>
           <a:p>
             <a:pPr lvl="3"/>
             <a:r>
-              <a:rPr lang="en-US" smtClean="0"/>
+              <a:rPr lang="en-US"/>
               <a:t>Fourth level</a:t>
             </a:r>
           </a:p>
           <a:p>
             <a:pPr lvl="4"/>
             <a:r>
-              <a:rPr lang="en-US" smtClean="0"/>
+              <a:rPr lang="en-US"/>
               <a:t>Fifth level</a:t>
             </a:r>
             <a:endParaRPr lang="en-SG"/>
@@ -1656,7 +1672,7 @@
           <a:p>
             <a:pPr lvl="0"/>
             <a:r>
-              <a:rPr lang="en-US" smtClean="0"/>
+              <a:rPr lang="en-US"/>
               <a:t>Click to edit Master text styles</a:t>
             </a:r>
           </a:p>
@@ -1712,35 +1728,35 @@
           <a:p>
             <a:pPr lvl="0"/>
             <a:r>
-              <a:rPr lang="en-US" smtClean="0"/>
+              <a:rPr lang="en-US"/>
               <a:t>Click to edit Master text styles</a:t>
             </a:r>
           </a:p>
           <a:p>
             <a:pPr lvl="1"/>
             <a:r>
-              <a:rPr lang="en-US" smtClean="0"/>
+              <a:rPr lang="en-US"/>
               <a:t>Second level</a:t>
             </a:r>
           </a:p>
           <a:p>
             <a:pPr lvl="2"/>
             <a:r>
-              <a:rPr lang="en-US" smtClean="0"/>
+              <a:rPr lang="en-US"/>
               <a:t>Third level</a:t>
             </a:r>
           </a:p>
           <a:p>
             <a:pPr lvl="3"/>
             <a:r>
-              <a:rPr lang="en-US" smtClean="0"/>
+              <a:rPr lang="en-US"/>
               <a:t>Fourth level</a:t>
             </a:r>
           </a:p>
           <a:p>
             <a:pPr lvl="4"/>
             <a:r>
-              <a:rPr lang="en-US" smtClean="0"/>
+              <a:rPr lang="en-US"/>
               <a:t>Fifth level</a:t>
             </a:r>
             <a:endParaRPr lang="en-SG"/>
@@ -1764,7 +1780,7 @@
           <a:p>
             <a:fld id="{4774CCBD-3109-4052-850F-719DC0B1A9B8}" type="datetimeFigureOut">
               <a:rPr lang="en-SG" smtClean="0"/>
-              <a:t>1/6/2017</a:t>
+              <a:t>9/8/2023</a:t>
             </a:fld>
             <a:endParaRPr lang="en-SG"/>
           </a:p>
@@ -1858,7 +1874,7 @@
           <a:lstStyle/>
           <a:p>
             <a:r>
-              <a:rPr lang="en-US" smtClean="0"/>
+              <a:rPr lang="en-US"/>
               <a:t>Click to edit Master title style</a:t>
             </a:r>
             <a:endParaRPr lang="en-SG"/>
@@ -1882,7 +1898,7 @@
           <a:p>
             <a:fld id="{4774CCBD-3109-4052-850F-719DC0B1A9B8}" type="datetimeFigureOut">
               <a:rPr lang="en-SG" smtClean="0"/>
-              <a:t>1/6/2017</a:t>
+              <a:t>9/8/2023</a:t>
             </a:fld>
             <a:endParaRPr lang="en-SG"/>
           </a:p>
@@ -1977,7 +1993,7 @@
           <a:p>
             <a:fld id="{4774CCBD-3109-4052-850F-719DC0B1A9B8}" type="datetimeFigureOut">
               <a:rPr lang="en-SG" smtClean="0"/>
-              <a:t>1/6/2017</a:t>
+              <a:t>9/8/2023</a:t>
             </a:fld>
             <a:endParaRPr lang="en-SG"/>
           </a:p>
@@ -2080,7 +2096,7 @@
           </a:lstStyle>
           <a:p>
             <a:r>
-              <a:rPr lang="en-US" smtClean="0"/>
+              <a:rPr lang="en-US"/>
               <a:t>Click to edit Master title style</a:t>
             </a:r>
             <a:endParaRPr lang="en-SG"/>
@@ -2137,35 +2153,35 @@
           <a:p>
             <a:pPr lvl="0"/>
             <a:r>
-              <a:rPr lang="en-US" smtClean="0"/>
+              <a:rPr lang="en-US"/>
               <a:t>Click to edit Master text styles</a:t>
             </a:r>
           </a:p>
           <a:p>
             <a:pPr lvl="1"/>
             <a:r>
-              <a:rPr lang="en-US" smtClean="0"/>
+              <a:rPr lang="en-US"/>
               <a:t>Second level</a:t>
             </a:r>
           </a:p>
           <a:p>
             <a:pPr lvl="2"/>
             <a:r>
-              <a:rPr lang="en-US" smtClean="0"/>
+              <a:rPr lang="en-US"/>
               <a:t>Third level</a:t>
             </a:r>
           </a:p>
           <a:p>
             <a:pPr lvl="3"/>
             <a:r>
-              <a:rPr lang="en-US" smtClean="0"/>
+              <a:rPr lang="en-US"/>
               <a:t>Fourth level</a:t>
             </a:r>
           </a:p>
           <a:p>
             <a:pPr lvl="4"/>
             <a:r>
-              <a:rPr lang="en-US" smtClean="0"/>
+              <a:rPr lang="en-US"/>
               <a:t>Fifth level</a:t>
             </a:r>
             <a:endParaRPr lang="en-SG"/>
@@ -2231,7 +2247,7 @@
           <a:p>
             <a:pPr lvl="0"/>
             <a:r>
-              <a:rPr lang="en-US" smtClean="0"/>
+              <a:rPr lang="en-US"/>
               <a:t>Click to edit Master text styles</a:t>
             </a:r>
           </a:p>
@@ -2254,7 +2270,7 @@
           <a:p>
             <a:fld id="{4774CCBD-3109-4052-850F-719DC0B1A9B8}" type="datetimeFigureOut">
               <a:rPr lang="en-SG" smtClean="0"/>
-              <a:t>1/6/2017</a:t>
+              <a:t>9/8/2023</a:t>
             </a:fld>
             <a:endParaRPr lang="en-SG"/>
           </a:p>
@@ -2357,7 +2373,7 @@
           </a:lstStyle>
           <a:p>
             <a:r>
-              <a:rPr lang="en-US" smtClean="0"/>
+              <a:rPr lang="en-US"/>
               <a:t>Click to edit Master title style</a:t>
             </a:r>
             <a:endParaRPr lang="en-SG"/>
@@ -2484,7 +2500,7 @@
           <a:p>
             <a:pPr lvl="0"/>
             <a:r>
-              <a:rPr lang="en-US" smtClean="0"/>
+              <a:rPr lang="en-US"/>
               <a:t>Click to edit Master text styles</a:t>
             </a:r>
           </a:p>
@@ -2507,7 +2523,7 @@
           <a:p>
             <a:fld id="{4774CCBD-3109-4052-850F-719DC0B1A9B8}" type="datetimeFigureOut">
               <a:rPr lang="en-SG" smtClean="0"/>
-              <a:t>1/6/2017</a:t>
+              <a:t>9/8/2023</a:t>
             </a:fld>
             <a:endParaRPr lang="en-SG"/>
           </a:p>
@@ -2616,7 +2632,7 @@
           <a:lstStyle/>
           <a:p>
             <a:r>
-              <a:rPr lang="en-US" smtClean="0"/>
+              <a:rPr lang="en-US"/>
               <a:t>Click to edit Master title style</a:t>
             </a:r>
             <a:endParaRPr lang="en-SG"/>
@@ -2650,35 +2666,35 @@
           <a:p>
             <a:pPr lvl="0"/>
             <a:r>
-              <a:rPr lang="en-US" smtClean="0"/>
+              <a:rPr lang="en-US"/>
               <a:t>Click to edit Master text styles</a:t>
             </a:r>
           </a:p>
           <a:p>
             <a:pPr lvl="1"/>
             <a:r>
-              <a:rPr lang="en-US" smtClean="0"/>
+              <a:rPr lang="en-US"/>
               <a:t>Second level</a:t>
             </a:r>
           </a:p>
           <a:p>
             <a:pPr lvl="2"/>
             <a:r>
-              <a:rPr lang="en-US" smtClean="0"/>
+              <a:rPr lang="en-US"/>
               <a:t>Third level</a:t>
             </a:r>
           </a:p>
           <a:p>
             <a:pPr lvl="3"/>
             <a:r>
-              <a:rPr lang="en-US" smtClean="0"/>
+              <a:rPr lang="en-US"/>
               <a:t>Fourth level</a:t>
             </a:r>
           </a:p>
           <a:p>
             <a:pPr lvl="4"/>
             <a:r>
-              <a:rPr lang="en-US" smtClean="0"/>
+              <a:rPr lang="en-US"/>
               <a:t>Fifth level</a:t>
             </a:r>
             <a:endParaRPr lang="en-SG"/>
@@ -2720,7 +2736,7 @@
           <a:p>
             <a:fld id="{4774CCBD-3109-4052-850F-719DC0B1A9B8}" type="datetimeFigureOut">
               <a:rPr lang="en-SG" smtClean="0"/>
-              <a:t>1/6/2017</a:t>
+              <a:t>9/8/2023</a:t>
             </a:fld>
             <a:endParaRPr lang="en-SG"/>
           </a:p>
@@ -3271,7 +3287,7 @@
         <p:spPr bwMode="auto">
           <a:xfrm>
             <a:off x="3042910" y="1223220"/>
-            <a:ext cx="0" cy="5456238"/>
+            <a:ext cx="0" cy="3213892"/>
           </a:xfrm>
           <a:prstGeom prst="line">
             <a:avLst/>
@@ -3370,7 +3386,7 @@
         <p:spPr bwMode="auto">
           <a:xfrm>
             <a:off x="5786110" y="1070820"/>
-            <a:ext cx="0" cy="5608638"/>
+            <a:ext cx="0" cy="3366292"/>
           </a:xfrm>
           <a:prstGeom prst="line">
             <a:avLst/>
@@ -3458,7 +3474,7 @@
               <a:buNone/>
             </a:pPr>
             <a:r>
-              <a:rPr lang="en-US" sz="2000" dirty="0" smtClean="0">
+              <a:rPr lang="en-US" sz="2000" dirty="0">
                 <a:solidFill>
                   <a:schemeClr val="tx1"/>
                 </a:solidFill>
@@ -3466,7 +3482,7 @@
               <a:t>:</a:t>
             </a:r>
             <a:r>
-              <a:rPr lang="en-US" sz="2000" smtClean="0">
+              <a:rPr lang="en-US" sz="2000">
                 <a:solidFill>
                   <a:schemeClr val="tx1"/>
                 </a:solidFill>
@@ -3645,7 +3661,7 @@
           </a:lstStyle>
           <a:p>
             <a:r>
-              <a:rPr lang="en-US" sz="2000" dirty="0" smtClean="0">
+              <a:rPr lang="en-US" sz="2000" dirty="0">
                 <a:solidFill>
                   <a:srgbClr val="C00000"/>
                 </a:solidFill>
@@ -3653,12 +3669,6 @@
               </a:rPr>
               <a:t>loop      [ until won or lost ]</a:t>
             </a:r>
-            <a:endParaRPr lang="en-US" sz="2000" dirty="0">
-              <a:solidFill>
-                <a:srgbClr val="C00000"/>
-              </a:solidFill>
-              <a:cs typeface="Arial" charset="0"/>
-            </a:endParaRPr>
           </a:p>
         </p:txBody>
       </p:sp>
@@ -3985,46 +3995,46 @@
               <a:buNone/>
             </a:pPr>
             <a:r>
-              <a:rPr lang="en-US" sz="2000" b="1" dirty="0" smtClean="0">
+              <a:rPr lang="en-US" sz="2000" b="1" dirty="0">
                 <a:latin typeface="Courier New" pitchFamily="49" charset="0"/>
                 <a:cs typeface="Courier New" pitchFamily="49" charset="0"/>
               </a:rPr>
               <a:t>mark </a:t>
             </a:r>
             <a:r>
-              <a:rPr lang="en-US" sz="2000" b="1" dirty="0" err="1" smtClean="0">
+              <a:rPr lang="en-US" sz="2000" b="1" dirty="0" err="1">
                 <a:latin typeface="Courier New" pitchFamily="49" charset="0"/>
                 <a:cs typeface="Courier New" pitchFamily="49" charset="0"/>
               </a:rPr>
               <a:t>x,y</a:t>
             </a:r>
             <a:r>
-              <a:rPr lang="en-US" sz="2000" b="1" dirty="0" smtClean="0">
+              <a:rPr lang="en-US" sz="2000" b="1" dirty="0">
                 <a:latin typeface="Courier New" pitchFamily="49" charset="0"/>
                 <a:cs typeface="Courier New" pitchFamily="49" charset="0"/>
               </a:rPr>
               <a:t>  </a:t>
             </a:r>
             <a:r>
-              <a:rPr lang="en-US" sz="2000" i="1" dirty="0" smtClean="0">
+              <a:rPr lang="en-US" sz="2000" i="1" dirty="0">
                 <a:latin typeface="Calibri" pitchFamily="34" charset="0"/>
               </a:rPr>
               <a:t>OR </a:t>
             </a:r>
             <a:br>
-              <a:rPr lang="en-US" sz="2000" i="1" dirty="0" smtClean="0">
+              <a:rPr lang="en-US" sz="2000" i="1" dirty="0">
                 <a:latin typeface="Calibri" pitchFamily="34" charset="0"/>
               </a:rPr>
             </a:br>
             <a:r>
-              <a:rPr lang="en-US" sz="2000" b="1" dirty="0" smtClean="0">
+              <a:rPr lang="en-US" sz="2000" b="1" dirty="0">
                 <a:latin typeface="Courier New" pitchFamily="49" charset="0"/>
                 <a:cs typeface="Courier New" pitchFamily="49" charset="0"/>
               </a:rPr>
               <a:t>clear </a:t>
             </a:r>
             <a:r>
-              <a:rPr lang="en-US" sz="2000" b="1" dirty="0" err="1" smtClean="0">
+              <a:rPr lang="en-US" sz="2000" b="1" dirty="0" err="1">
                 <a:latin typeface="Courier New" pitchFamily="49" charset="0"/>
                 <a:cs typeface="Courier New" pitchFamily="49" charset="0"/>
               </a:rPr>
@@ -4364,17 +4374,8 @@
               <a:rPr lang="en-US" sz="2000" i="1" dirty="0">
                 <a:latin typeface="Calibri" pitchFamily="34" charset="0"/>
               </a:rPr>
-              <a:t>Show updated </a:t>
-            </a:r>
-            <a:r>
-              <a:rPr lang="en-US" sz="2000" i="1" dirty="0" smtClean="0">
-                <a:latin typeface="Calibri" pitchFamily="34" charset="0"/>
-              </a:rPr>
-              <a:t>minefield</a:t>
-            </a:r>
-            <a:endParaRPr lang="en-US" sz="2000" i="1" dirty="0">
-              <a:latin typeface="Calibri" pitchFamily="34" charset="0"/>
-            </a:endParaRPr>
+              <a:t>Show updated minefield</a:t>
+            </a:r>
           </a:p>
         </p:txBody>
       </p:sp>
@@ -4649,10 +4650,9 @@
           <a:p>
             <a:pPr algn="ctr"/>
             <a:r>
-              <a:rPr lang="en-US" sz="2000" dirty="0" smtClean="0"/>
+              <a:rPr lang="en-US" sz="2000" dirty="0"/>
               <a:t>Player</a:t>
             </a:r>
-            <a:endParaRPr lang="en-US" sz="2000" dirty="0"/>
           </a:p>
         </p:txBody>
       </p:sp>

</xml_diff>